<commit_message>
pnas submission march 5
</commit_message>
<xml_diff>
--- a/Final_figures/Fig1_2.1.pptx
+++ b/Final_figures/Fig1_2.1.pptx
@@ -115,7 +115,7 @@
 <file path=ppt/revisionInfo.xml><?xml version="1.0" encoding="utf-8"?>
 <p1510:revInfo xmlns:a="http://schemas.openxmlformats.org/drawingml/2006/main" xmlns:r="http://schemas.openxmlformats.org/officeDocument/2006/relationships" xmlns:p1510="http://schemas.microsoft.com/office/powerpoint/2015/10/main">
   <p1510:revLst>
-    <p1510:client id="{332083F5-D50D-42EF-BF02-BBC71EFED537}" v="1" dt="2024-12-26T23:26:59.817"/>
+    <p1510:client id="{F4C0FEA9-66F3-43B7-95B7-AA10006D747B}" v="5" dt="2025-01-21T16:25:34.279"/>
   </p1510:revLst>
 </p1510:revInfo>
 </file>
@@ -210,6 +210,38 @@
       </pc:sldChg>
     </pc:docChg>
   </pc:docChgLst>
+  <pc:docChgLst>
+    <pc:chgData name="Geoffrey Williams" userId="d73f4799e042ccf0" providerId="LiveId" clId="{F4C0FEA9-66F3-43B7-95B7-AA10006D747B}"/>
+    <pc:docChg chg="undo redo custSel modSld">
+      <pc:chgData name="Geoffrey Williams" userId="d73f4799e042ccf0" providerId="LiveId" clId="{F4C0FEA9-66F3-43B7-95B7-AA10006D747B}" dt="2025-01-21T16:25:34.279" v="27"/>
+      <pc:docMkLst>
+        <pc:docMk/>
+      </pc:docMkLst>
+      <pc:sldChg chg="modSp mod">
+        <pc:chgData name="Geoffrey Williams" userId="d73f4799e042ccf0" providerId="LiveId" clId="{F4C0FEA9-66F3-43B7-95B7-AA10006D747B}" dt="2025-01-21T16:25:34.279" v="27"/>
+        <pc:sldMkLst>
+          <pc:docMk/>
+          <pc:sldMk cId="2395964817" sldId="256"/>
+        </pc:sldMkLst>
+        <pc:graphicFrameChg chg="mod modGraphic">
+          <ac:chgData name="Geoffrey Williams" userId="d73f4799e042ccf0" providerId="LiveId" clId="{F4C0FEA9-66F3-43B7-95B7-AA10006D747B}" dt="2025-01-21T16:25:34.279" v="27"/>
+          <ac:graphicFrameMkLst>
+            <pc:docMk/>
+            <pc:sldMk cId="2395964817" sldId="256"/>
+            <ac:graphicFrameMk id="5" creationId="{2EAF2825-F501-6A8B-E49A-0FF3982BF600}"/>
+          </ac:graphicFrameMkLst>
+        </pc:graphicFrameChg>
+        <pc:graphicFrameChg chg="mod">
+          <ac:chgData name="Geoffrey Williams" userId="d73f4799e042ccf0" providerId="LiveId" clId="{F4C0FEA9-66F3-43B7-95B7-AA10006D747B}" dt="2025-01-20T21:00:00.660" v="25"/>
+          <ac:graphicFrameMkLst>
+            <pc:docMk/>
+            <pc:sldMk cId="2395964817" sldId="256"/>
+            <ac:graphicFrameMk id="32" creationId="{E68533C3-1224-F4C5-5431-944280A6D425}"/>
+          </ac:graphicFrameMkLst>
+        </pc:graphicFrameChg>
+      </pc:sldChg>
+    </pc:docChg>
+  </pc:docChgLst>
 </pc:chgInfo>
 </file>
 
@@ -344,7 +376,7 @@
           <a:p>
             <a:fld id="{62551BA8-6D88-43B0-A518-2811C9079E11}" type="datetimeFigureOut">
               <a:rPr lang="en-US" smtClean="0"/>
-              <a:t>12/26/2024</a:t>
+              <a:t>1/20/2025</a:t>
             </a:fld>
             <a:endParaRPr lang="en-US"/>
           </a:p>
@@ -514,7 +546,7 @@
           <a:p>
             <a:fld id="{62551BA8-6D88-43B0-A518-2811C9079E11}" type="datetimeFigureOut">
               <a:rPr lang="en-US" smtClean="0"/>
-              <a:t>12/26/2024</a:t>
+              <a:t>1/20/2025</a:t>
             </a:fld>
             <a:endParaRPr lang="en-US"/>
           </a:p>
@@ -694,7 +726,7 @@
           <a:p>
             <a:fld id="{62551BA8-6D88-43B0-A518-2811C9079E11}" type="datetimeFigureOut">
               <a:rPr lang="en-US" smtClean="0"/>
-              <a:t>12/26/2024</a:t>
+              <a:t>1/20/2025</a:t>
             </a:fld>
             <a:endParaRPr lang="en-US"/>
           </a:p>
@@ -864,7 +896,7 @@
           <a:p>
             <a:fld id="{62551BA8-6D88-43B0-A518-2811C9079E11}" type="datetimeFigureOut">
               <a:rPr lang="en-US" smtClean="0"/>
-              <a:t>12/26/2024</a:t>
+              <a:t>1/20/2025</a:t>
             </a:fld>
             <a:endParaRPr lang="en-US"/>
           </a:p>
@@ -1110,7 +1142,7 @@
           <a:p>
             <a:fld id="{62551BA8-6D88-43B0-A518-2811C9079E11}" type="datetimeFigureOut">
               <a:rPr lang="en-US" smtClean="0"/>
-              <a:t>12/26/2024</a:t>
+              <a:t>1/20/2025</a:t>
             </a:fld>
             <a:endParaRPr lang="en-US"/>
           </a:p>
@@ -1342,7 +1374,7 @@
           <a:p>
             <a:fld id="{62551BA8-6D88-43B0-A518-2811C9079E11}" type="datetimeFigureOut">
               <a:rPr lang="en-US" smtClean="0"/>
-              <a:t>12/26/2024</a:t>
+              <a:t>1/20/2025</a:t>
             </a:fld>
             <a:endParaRPr lang="en-US"/>
           </a:p>
@@ -1709,7 +1741,7 @@
           <a:p>
             <a:fld id="{62551BA8-6D88-43B0-A518-2811C9079E11}" type="datetimeFigureOut">
               <a:rPr lang="en-US" smtClean="0"/>
-              <a:t>12/26/2024</a:t>
+              <a:t>1/20/2025</a:t>
             </a:fld>
             <a:endParaRPr lang="en-US"/>
           </a:p>
@@ -1827,7 +1859,7 @@
           <a:p>
             <a:fld id="{62551BA8-6D88-43B0-A518-2811C9079E11}" type="datetimeFigureOut">
               <a:rPr lang="en-US" smtClean="0"/>
-              <a:t>12/26/2024</a:t>
+              <a:t>1/20/2025</a:t>
             </a:fld>
             <a:endParaRPr lang="en-US"/>
           </a:p>
@@ -1922,7 +1954,7 @@
           <a:p>
             <a:fld id="{62551BA8-6D88-43B0-A518-2811C9079E11}" type="datetimeFigureOut">
               <a:rPr lang="en-US" smtClean="0"/>
-              <a:t>12/26/2024</a:t>
+              <a:t>1/20/2025</a:t>
             </a:fld>
             <a:endParaRPr lang="en-US"/>
           </a:p>
@@ -2199,7 +2231,7 @@
           <a:p>
             <a:fld id="{62551BA8-6D88-43B0-A518-2811C9079E11}" type="datetimeFigureOut">
               <a:rPr lang="en-US" smtClean="0"/>
-              <a:t>12/26/2024</a:t>
+              <a:t>1/20/2025</a:t>
             </a:fld>
             <a:endParaRPr lang="en-US"/>
           </a:p>
@@ -2456,7 +2488,7 @@
           <a:p>
             <a:fld id="{62551BA8-6D88-43B0-A518-2811C9079E11}" type="datetimeFigureOut">
               <a:rPr lang="en-US" smtClean="0"/>
-              <a:t>12/26/2024</a:t>
+              <a:t>1/20/2025</a:t>
             </a:fld>
             <a:endParaRPr lang="en-US"/>
           </a:p>
@@ -2669,7 +2701,7 @@
           <a:p>
             <a:fld id="{62551BA8-6D88-43B0-A518-2811C9079E11}" type="datetimeFigureOut">
               <a:rPr lang="en-US" smtClean="0"/>
-              <a:t>12/26/2024</a:t>
+              <a:t>1/20/2025</a:t>
             </a:fld>
             <a:endParaRPr lang="en-US"/>
           </a:p>
@@ -3089,7 +3121,7 @@
           <p:nvPr>
             <p:extLst>
               <p:ext uri="{D42A27DB-BD31-4B8C-83A1-F6EECF244321}">
-                <p14:modId xmlns:p14="http://schemas.microsoft.com/office/powerpoint/2010/main" val="860187220"/>
+                <p14:modId xmlns:p14="http://schemas.microsoft.com/office/powerpoint/2010/main" val="2988622517"/>
               </p:ext>
             </p:extLst>
           </p:nvPr>
@@ -3406,6 +3438,18 @@
                     <a:lnT>
                       <a:noFill/>
                     </a:lnT>
+                    <a:lnB w="12700" cmpd="sng">
+                      <a:noFill/>
+                      <a:prstDash val="solid"/>
+                    </a:lnB>
+                    <a:lnTlToBr w="12700" cmpd="sng">
+                      <a:noFill/>
+                      <a:prstDash val="solid"/>
+                    </a:lnTlToBr>
+                    <a:lnBlToTr w="12700" cmpd="sng">
+                      <a:noFill/>
+                      <a:prstDash val="solid"/>
+                    </a:lnBlToTr>
                     <a:solidFill>
                       <a:srgbClr val="D9D9D9"/>
                     </a:solidFill>
@@ -4131,8 +4175,9 @@
                     <a:lnR>
                       <a:noFill/>
                     </a:lnR>
-                    <a:lnT>
-                      <a:noFill/>
+                    <a:lnT w="12700" cmpd="sng">
+                      <a:noFill/>
+                      <a:prstDash val="solid"/>
                     </a:lnT>
                     <a:lnB>
                       <a:noFill/>
@@ -7203,7 +7248,7 @@
           <p:nvPr>
             <p:extLst>
               <p:ext uri="{D42A27DB-BD31-4B8C-83A1-F6EECF244321}">
-                <p14:modId xmlns:p14="http://schemas.microsoft.com/office/powerpoint/2010/main" val="527455412"/>
+                <p14:modId xmlns:p14="http://schemas.microsoft.com/office/powerpoint/2010/main" val="607479638"/>
               </p:ext>
             </p:extLst>
           </p:nvPr>
@@ -8026,14 +8071,30 @@
                         </a:spcAft>
                       </a:pPr>
                       <a:r>
-                        <a:rPr lang="en-US" sz="1000" dirty="0">
+                        <a:rPr lang="es-AR" sz="1000" b="0" dirty="0" err="1">
                           <a:effectLst/>
                           <a:latin typeface="Arial" panose="020B0604020202020204" pitchFamily="34" charset="0"/>
                           <a:cs typeface="Arial" panose="020B0604020202020204" pitchFamily="34" charset="0"/>
                         </a:rPr>
-                        <a:t>Driving factor</a:t>
-                      </a:r>
-                      <a:endParaRPr lang="en-US" sz="800" dirty="0">
+                        <a:t>Barrier</a:t>
+                      </a:r>
+                      <a:r>
+                        <a:rPr lang="es-AR" sz="1000" b="0" dirty="0">
+                          <a:effectLst/>
+                          <a:latin typeface="Arial" panose="020B0604020202020204" pitchFamily="34" charset="0"/>
+                          <a:cs typeface="Arial" panose="020B0604020202020204" pitchFamily="34" charset="0"/>
+                        </a:rPr>
+                        <a:t>/</a:t>
+                      </a:r>
+                      <a:r>
+                        <a:rPr lang="es-AR" sz="1000" b="0" dirty="0" err="1">
+                          <a:effectLst/>
+                          <a:latin typeface="Arial" panose="020B0604020202020204" pitchFamily="34" charset="0"/>
+                          <a:cs typeface="Arial" panose="020B0604020202020204" pitchFamily="34" charset="0"/>
+                        </a:rPr>
+                        <a:t>filter</a:t>
+                      </a:r>
+                      <a:endParaRPr lang="en-US" sz="800" b="0" dirty="0">
                         <a:effectLst/>
                         <a:latin typeface="Arial" panose="020B0604020202020204" pitchFamily="34" charset="0"/>
                         <a:ea typeface="Calibri" panose="020F0502020204030204" pitchFamily="34" charset="0"/>
@@ -8063,7 +8124,23 @@
                           <a:latin typeface="Arial" panose="020B0604020202020204" pitchFamily="34" charset="0"/>
                           <a:cs typeface="Arial" panose="020B0604020202020204" pitchFamily="34" charset="0"/>
                         </a:rPr>
-                        <a:t>Distribution of related taxa in geographic space (includes phylogeographic similarity, or relatively smaller phylogeographic distance, among native forest tree and shrub communities; and number of non-native forest tree and shrub species that are established from one region in another)</a:t>
+                        <a:t>Distribution of related taxa in geographic space (includes phylogeographic similarity—</a:t>
+                      </a:r>
+                      <a:r>
+                        <a:rPr lang="en-US" sz="1000" i="1" dirty="0">
+                          <a:effectLst/>
+                          <a:latin typeface="Arial" panose="020B0604020202020204" pitchFamily="34" charset="0"/>
+                          <a:cs typeface="Arial" panose="020B0604020202020204" pitchFamily="34" charset="0"/>
+                        </a:rPr>
+                        <a:t>i.e.</a:t>
+                      </a:r>
+                      <a:r>
+                        <a:rPr lang="en-US" sz="1000" dirty="0">
+                          <a:effectLst/>
+                          <a:latin typeface="Arial" panose="020B0604020202020204" pitchFamily="34" charset="0"/>
+                          <a:cs typeface="Arial" panose="020B0604020202020204" pitchFamily="34" charset="0"/>
+                        </a:rPr>
+                        <a:t>, relatively smaller phylogeographic distance—among native forest tree and shrub communities; and number of non-native forest tree and shrub species that are established from one region in another)</a:t>
                       </a:r>
                       <a:endParaRPr lang="en-US" sz="800" dirty="0">
                         <a:effectLst/>
@@ -8129,14 +8206,30 @@
                         </a:spcAft>
                       </a:pPr>
                       <a:r>
-                        <a:rPr lang="en-US" sz="1000" dirty="0">
+                        <a:rPr lang="es-AR" sz="1000" b="0" dirty="0" err="1">
                           <a:effectLst/>
                           <a:latin typeface="Arial" panose="020B0604020202020204" pitchFamily="34" charset="0"/>
                           <a:cs typeface="Arial" panose="020B0604020202020204" pitchFamily="34" charset="0"/>
                         </a:rPr>
-                        <a:t>Driving factor</a:t>
-                      </a:r>
-                      <a:endParaRPr lang="en-US" sz="800" dirty="0">
+                        <a:t>Barrier</a:t>
+                      </a:r>
+                      <a:r>
+                        <a:rPr lang="es-AR" sz="1000" b="0" dirty="0">
+                          <a:effectLst/>
+                          <a:latin typeface="Arial" panose="020B0604020202020204" pitchFamily="34" charset="0"/>
+                          <a:cs typeface="Arial" panose="020B0604020202020204" pitchFamily="34" charset="0"/>
+                        </a:rPr>
+                        <a:t>/</a:t>
+                      </a:r>
+                      <a:r>
+                        <a:rPr lang="es-AR" sz="1000" b="0" dirty="0" err="1">
+                          <a:effectLst/>
+                          <a:latin typeface="Arial" panose="020B0604020202020204" pitchFamily="34" charset="0"/>
+                          <a:cs typeface="Arial" panose="020B0604020202020204" pitchFamily="34" charset="0"/>
+                        </a:rPr>
+                        <a:t>filter</a:t>
+                      </a:r>
+                      <a:endParaRPr lang="en-US" sz="800" b="0" dirty="0">
                         <a:effectLst/>
                         <a:latin typeface="Arial" panose="020B0604020202020204" pitchFamily="34" charset="0"/>
                         <a:ea typeface="Calibri" panose="020F0502020204030204" pitchFamily="34" charset="0"/>

</xml_diff>